<commit_message>
update links to videos, add LibXOR link, update slides
</commit_message>
<xml_diff>
--- a/slides/pptx/week04.pptx
+++ b/slides/pptx/week04.pptx
@@ -21,6 +21,7 @@
     <p:sldId id="269" r:id="rId15"/>
     <p:sldId id="270" r:id="rId16"/>
     <p:sldId id="271" r:id="rId17"/>
+    <p:sldId id="272" r:id="rId18"/>
   </p:sldIdLst>
   <p:sldSz cx="12192000" cy="6858000"/>
   <p:notesSz cx="6858000" cy="9144000"/>
@@ -3629,15 +3630,7 @@
             </a:pPr>
             <a:r>
               <a:rPr/>
-              <a:t>Sky</a:t>
-            </a:r>
-            <a:r>
-              <a:rPr/>
-              <a:t> </a:t>
-            </a:r>
-            <a:r>
-              <a:rPr/>
-              <a:t>Model</a:t>
+              <a:t>Hosek-Wilkie</a:t>
             </a:r>
             <a:r>
               <a:rPr/>
@@ -3748,6 +3741,167 @@
 </file>
 
 <file path=ppt/slides/slide11.xml><?xml version="1.0" encoding="utf-8"?>
+<p:sld xmlns:a="http://schemas.openxmlformats.org/drawingml/2006/main" xmlns:r="http://schemas.openxmlformats.org/officeDocument/2006/relationships" xmlns:p="http://schemas.openxmlformats.org/presentationml/2006/main">
+  <p:cSld>
+    <p:spTree>
+      <p:nvGrpSpPr>
+        <p:cNvPr id="1" name=""/>
+        <p:cNvGrpSpPr/>
+        <p:nvPr/>
+      </p:nvGrpSpPr>
+      <p:grpSpPr>
+        <a:xfrm>
+          <a:off x="0" y="0"/>
+          <a:ext cx="0" cy="0"/>
+          <a:chOff x="0" y="0"/>
+          <a:chExt cx="0" cy="0"/>
+        </a:xfrm>
+      </p:grpSpPr>
+      <p:sp>
+        <p:nvSpPr>
+          <p:cNvPr id="2" name="Title 1">
+            <a:extLst>
+              <a:ext uri="{FF2B5EF4-FFF2-40B4-BE49-F238E27FC236}">
+                <a16:creationId xmlns:a16="http://schemas.microsoft.com/office/drawing/2014/main" id="{B9171DC7-83DC-4812-B6D6-720FD0903317}"/>
+              </a:ext>
+            </a:extLst>
+          </p:cNvPr>
+          <p:cNvSpPr>
+            <a:spLocks noGrp="1"/>
+          </p:cNvSpPr>
+          <p:nvPr>
+            <p:ph type="title"/>
+          </p:nvPr>
+        </p:nvSpPr>
+        <p:spPr/>
+        <p:txBody>
+          <a:bodyPr/>
+          <a:lstStyle/>
+          <a:p>
+            <a:pPr lvl="0" marL="0" indent="0">
+              <a:buNone/>
+            </a:pPr>
+            <a:r>
+              <a:rPr/>
+              <a:t>CIE</a:t>
+            </a:r>
+            <a:r>
+              <a:rPr/>
+              <a:t> </a:t>
+            </a:r>
+            <a:r>
+              <a:rPr/>
+              <a:t>Model</a:t>
+            </a:r>
+            <a:r>
+              <a:rPr/>
+              <a:t> </a:t>
+            </a:r>
+            <a:r>
+              <a:rPr/>
+              <a:t>Frame</a:t>
+            </a:r>
+            <a:r>
+              <a:rPr/>
+              <a:t> </a:t>
+            </a:r>
+            <a:r>
+              <a:rPr/>
+              <a:t>of</a:t>
+            </a:r>
+            <a:r>
+              <a:rPr/>
+              <a:t> </a:t>
+            </a:r>
+            <a:r>
+              <a:rPr/>
+              <a:t>Reference</a:t>
+            </a:r>
+          </a:p>
+        </p:txBody>
+      </p:sp>
+      <p:pic>
+        <p:nvPicPr>
+          <p:cNvPr descr="images/cie-sunsky.png" id="0" name="Picture 1"/>
+          <p:cNvPicPr>
+            <a:picLocks noGrp="1" noChangeAspect="1"/>
+          </p:cNvPicPr>
+          <p:nvPr/>
+        </p:nvPicPr>
+        <p:blipFill>
+          <a:blip r:embed="rId2"/>
+          <a:stretch>
+            <a:fillRect/>
+          </a:stretch>
+        </p:blipFill>
+        <p:spPr bwMode="auto">
+          <a:xfrm>
+            <a:off x="3302000" y="1816100"/>
+            <a:ext cx="5588000" cy="3835400"/>
+          </a:xfrm>
+          <a:prstGeom prst="rect">
+            <a:avLst/>
+          </a:prstGeom>
+          <a:noFill/>
+          <a:ln w="9525">
+            <a:noFill/>
+            <a:headEnd/>
+            <a:tailEnd/>
+          </a:ln>
+        </p:spPr>
+      </p:pic>
+      <p:sp>
+        <p:nvSpPr>
+          <p:cNvPr id="1" name="TextBox 3"/>
+          <p:cNvSpPr txBox="1"/>
+          <p:nvPr/>
+        </p:nvSpPr>
+        <p:spPr>
+          <a:xfrm>
+            <a:off x="838200" y="5651500"/>
+            <a:ext cx="10515600" cy="508000"/>
+          </a:xfrm>
+          <a:prstGeom prst="rect">
+            <a:avLst/>
+          </a:prstGeom>
+          <a:noFill/>
+        </p:spPr>
+        <p:txBody>
+          <a:bodyPr/>
+          <a:lstStyle/>
+          <a:p>
+            <a:pPr lvl="0" marL="0" indent="0" algn="ctr">
+              <a:buNone/>
+            </a:pPr>
+            <a:r>
+              <a:rPr/>
+              <a:t>CIE</a:t>
+            </a:r>
+            <a:r>
+              <a:rPr/>
+              <a:t> </a:t>
+            </a:r>
+            <a:r>
+              <a:rPr/>
+              <a:t>ISO</a:t>
+            </a:r>
+            <a:r>
+              <a:rPr/>
+              <a:t> </a:t>
+            </a:r>
+            <a:r>
+              <a:rPr/>
+              <a:t>15469:2004</a:t>
+            </a:r>
+          </a:p>
+        </p:txBody>
+      </p:sp>
+    </p:spTree>
+  </p:cSld>
+</p:sld>
+</file>
+
+<file path=ppt/slides/slide12.xml><?xml version="1.0" encoding="utf-8"?>
 <p:sld xmlns:a="http://schemas.openxmlformats.org/drawingml/2006/main" xmlns:r="http://schemas.openxmlformats.org/officeDocument/2006/relationships" xmlns:p="http://schemas.openxmlformats.org/presentationml/2006/main">
   <p:cSld>
     <p:spTree>
@@ -3886,7 +4040,7 @@
 </p:sld>
 </file>
 
-<file path=ppt/slides/slide12.xml><?xml version="1.0" encoding="utf-8"?>
+<file path=ppt/slides/slide13.xml><?xml version="1.0" encoding="utf-8"?>
 <p:sld xmlns:a="http://schemas.openxmlformats.org/drawingml/2006/main" xmlns:r="http://schemas.openxmlformats.org/officeDocument/2006/relationships" xmlns:p="http://schemas.openxmlformats.org/presentationml/2006/main">
   <p:cSld>
     <p:spTree>
@@ -4023,7 +4177,7 @@
 </p:sld>
 </file>
 
-<file path=ppt/slides/slide13.xml><?xml version="1.0" encoding="utf-8"?>
+<file path=ppt/slides/slide14.xml><?xml version="1.0" encoding="utf-8"?>
 <p:sld xmlns:a="http://schemas.openxmlformats.org/drawingml/2006/main" xmlns:r="http://schemas.openxmlformats.org/officeDocument/2006/relationships" xmlns:p="http://schemas.openxmlformats.org/presentationml/2006/main">
   <p:cSld>
     <p:spTree>
@@ -4144,122 +4298,6 @@
 </p:sld>
 </file>
 
-<file path=ppt/slides/slide14.xml><?xml version="1.0" encoding="utf-8"?>
-<p:sld xmlns:a="http://schemas.openxmlformats.org/drawingml/2006/main" xmlns:r="http://schemas.openxmlformats.org/officeDocument/2006/relationships" xmlns:p="http://schemas.openxmlformats.org/presentationml/2006/main">
-  <p:cSld>
-    <p:spTree>
-      <p:nvGrpSpPr>
-        <p:cNvPr id="1" name=""/>
-        <p:cNvGrpSpPr/>
-        <p:nvPr/>
-      </p:nvGrpSpPr>
-      <p:grpSpPr>
-        <a:xfrm>
-          <a:off x="0" y="0"/>
-          <a:ext cx="0" cy="0"/>
-          <a:chOff x="0" y="0"/>
-          <a:chExt cx="0" cy="0"/>
-        </a:xfrm>
-      </p:grpSpPr>
-      <p:sp>
-        <p:nvSpPr>
-          <p:cNvPr id="2" name="Title 1">
-            <a:extLst>
-              <a:ext uri="{FF2B5EF4-FFF2-40B4-BE49-F238E27FC236}">
-                <a16:creationId xmlns:a16="http://schemas.microsoft.com/office/drawing/2014/main" id="{B9171DC7-83DC-4812-B6D6-720FD0903317}"/>
-              </a:ext>
-            </a:extLst>
-          </p:cNvPr>
-          <p:cNvSpPr>
-            <a:spLocks noGrp="1"/>
-          </p:cNvSpPr>
-          <p:nvPr>
-            <p:ph type="title"/>
-          </p:nvPr>
-        </p:nvSpPr>
-        <p:spPr/>
-        <p:txBody>
-          <a:bodyPr/>
-          <a:lstStyle/>
-          <a:p>
-            <a:pPr lvl="0" marL="0" indent="0">
-              <a:buNone/>
-            </a:pPr>
-            <a:r>
-              <a:rPr/>
-              <a:t>Astronomical</a:t>
-            </a:r>
-            <a:r>
-              <a:rPr/>
-              <a:t> </a:t>
-            </a:r>
-            <a:r>
-              <a:rPr/>
-              <a:t>Calculations</a:t>
-            </a:r>
-          </a:p>
-        </p:txBody>
-      </p:sp>
-      <p:sp>
-        <p:nvSpPr>
-          <p:cNvPr id="3" name="Content Placeholder 2">
-            <a:extLst>
-              <a:ext uri="{FF2B5EF4-FFF2-40B4-BE49-F238E27FC236}">
-                <a16:creationId xmlns:a16="http://schemas.microsoft.com/office/drawing/2014/main" id="{E3951675-2757-4186-87D6-120677EA8D01}"/>
-              </a:ext>
-            </a:extLst>
-          </p:cNvPr>
-          <p:cNvSpPr>
-            <a:spLocks noGrp="1"/>
-          </p:cNvSpPr>
-          <p:nvPr>
-            <p:ph idx="1"/>
-          </p:nvPr>
-        </p:nvSpPr>
-        <p:spPr/>
-        <p:txBody>
-          <a:bodyPr/>
-          <a:lstStyle/>
-          <a:p>
-            <a:pPr lvl="1"/>
-            <a:r>
-              <a:rPr/>
-              <a:t>Video: </a:t>
-            </a:r>
-            <a:r>
-              <a:rPr>
-                <a:hlinkClick r:id="rId2"/>
-              </a:rPr>
-              <a:t>Carla’s Island (1981)</a:t>
-            </a:r>
-          </a:p>
-          <a:p>
-            <a:pPr lvl="1"/>
-            <a:r>
-              <a:rPr/>
-              <a:t>Video: </a:t>
-            </a:r>
-            <a:r>
-              <a:rPr>
-                <a:hlinkClick r:id="rId3"/>
-              </a:rPr>
-              <a:t>NASA Voyager 2 Flyby (1981)</a:t>
-            </a:r>
-          </a:p>
-          <a:p>
-            <a:pPr lvl="1"/>
-            <a:r>
-              <a:rPr/>
-              <a:t>Use astronomical calculations to determine animation parameters</a:t>
-            </a:r>
-          </a:p>
-        </p:txBody>
-      </p:sp>
-    </p:spTree>
-  </p:cSld>
-</p:sld>
-</file>
-
 <file path=ppt/slides/slide15.xml><?xml version="1.0" encoding="utf-8"?>
 <p:sld xmlns:a="http://schemas.openxmlformats.org/drawingml/2006/main" xmlns:r="http://schemas.openxmlformats.org/officeDocument/2006/relationships" xmlns:p="http://schemas.openxmlformats.org/presentationml/2006/main">
   <p:cSld>
@@ -4303,7 +4341,15 @@
             </a:pPr>
             <a:r>
               <a:rPr/>
-              <a:t>Implementation</a:t>
+              <a:t>Astronomical</a:t>
+            </a:r>
+            <a:r>
+              <a:rPr/>
+              <a:t> </a:t>
+            </a:r>
+            <a:r>
+              <a:rPr/>
+              <a:t>Calculations</a:t>
             </a:r>
           </a:p>
         </p:txBody>
@@ -4332,7 +4378,33 @@
             <a:pPr lvl="1"/>
             <a:r>
               <a:rPr/>
-              <a:t>Example 6</a:t>
+              <a:t>Video: </a:t>
+            </a:r>
+            <a:r>
+              <a:rPr>
+                <a:hlinkClick r:id="rId2"/>
+              </a:rPr>
+              <a:t>Carla’s Island (1981)</a:t>
+            </a:r>
+          </a:p>
+          <a:p>
+            <a:pPr lvl="1"/>
+            <a:r>
+              <a:rPr/>
+              <a:t>Video: </a:t>
+            </a:r>
+            <a:r>
+              <a:rPr>
+                <a:hlinkClick r:id="rId3"/>
+              </a:rPr>
+              <a:t>NASA Voyager 2 Flyby (1981)</a:t>
+            </a:r>
+          </a:p>
+          <a:p>
+            <a:pPr lvl="1"/>
+            <a:r>
+              <a:rPr/>
+              <a:t>Use astronomical calculations to determine animation parameters</a:t>
             </a:r>
           </a:p>
         </p:txBody>
@@ -4343,6 +4415,88 @@
 </file>
 
 <file path=ppt/slides/slide16.xml><?xml version="1.0" encoding="utf-8"?>
+<p:sld xmlns:a="http://schemas.openxmlformats.org/drawingml/2006/main" xmlns:r="http://schemas.openxmlformats.org/officeDocument/2006/relationships" xmlns:p="http://schemas.openxmlformats.org/presentationml/2006/main">
+  <p:cSld>
+    <p:spTree>
+      <p:nvGrpSpPr>
+        <p:cNvPr id="1" name=""/>
+        <p:cNvGrpSpPr/>
+        <p:nvPr/>
+      </p:nvGrpSpPr>
+      <p:grpSpPr>
+        <a:xfrm>
+          <a:off x="0" y="0"/>
+          <a:ext cx="0" cy="0"/>
+          <a:chOff x="0" y="0"/>
+          <a:chExt cx="0" cy="0"/>
+        </a:xfrm>
+      </p:grpSpPr>
+      <p:sp>
+        <p:nvSpPr>
+          <p:cNvPr id="2" name="Title 1">
+            <a:extLst>
+              <a:ext uri="{FF2B5EF4-FFF2-40B4-BE49-F238E27FC236}">
+                <a16:creationId xmlns:a16="http://schemas.microsoft.com/office/drawing/2014/main" id="{B9171DC7-83DC-4812-B6D6-720FD0903317}"/>
+              </a:ext>
+            </a:extLst>
+          </p:cNvPr>
+          <p:cNvSpPr>
+            <a:spLocks noGrp="1"/>
+          </p:cNvSpPr>
+          <p:nvPr>
+            <p:ph type="title"/>
+          </p:nvPr>
+        </p:nvSpPr>
+        <p:spPr/>
+        <p:txBody>
+          <a:bodyPr/>
+          <a:lstStyle/>
+          <a:p>
+            <a:pPr lvl="0" marL="0" indent="0">
+              <a:buNone/>
+            </a:pPr>
+            <a:r>
+              <a:rPr/>
+              <a:t>Implementation</a:t>
+            </a:r>
+          </a:p>
+        </p:txBody>
+      </p:sp>
+      <p:sp>
+        <p:nvSpPr>
+          <p:cNvPr id="3" name="Content Placeholder 2">
+            <a:extLst>
+              <a:ext uri="{FF2B5EF4-FFF2-40B4-BE49-F238E27FC236}">
+                <a16:creationId xmlns:a16="http://schemas.microsoft.com/office/drawing/2014/main" id="{E3951675-2757-4186-87D6-120677EA8D01}"/>
+              </a:ext>
+            </a:extLst>
+          </p:cNvPr>
+          <p:cNvSpPr>
+            <a:spLocks noGrp="1"/>
+          </p:cNvSpPr>
+          <p:nvPr>
+            <p:ph idx="1"/>
+          </p:nvPr>
+        </p:nvSpPr>
+        <p:spPr/>
+        <p:txBody>
+          <a:bodyPr/>
+          <a:lstStyle/>
+          <a:p>
+            <a:pPr lvl="1"/>
+            <a:r>
+              <a:rPr/>
+              <a:t>Example 6</a:t>
+            </a:r>
+          </a:p>
+        </p:txBody>
+      </p:sp>
+    </p:spTree>
+  </p:cSld>
+</p:sld>
+</file>
+
+<file path=ppt/slides/slide17.xml><?xml version="1.0" encoding="utf-8"?>
 <p:sld xmlns:a="http://schemas.openxmlformats.org/drawingml/2006/main" xmlns:r="http://schemas.openxmlformats.org/officeDocument/2006/relationships" xmlns:p="http://schemas.openxmlformats.org/presentationml/2006/main">
   <p:cSld>
     <p:spTree>
@@ -5282,7 +5436,7 @@
             </a:pPr>
             <a:r>
               <a:rPr/>
-              <a:t>Sky</a:t>
+              <a:t>Preetham</a:t>
             </a:r>
             <a:r>
               <a:rPr/>
@@ -5290,7 +5444,15 @@
             </a:r>
             <a:r>
               <a:rPr/>
-              <a:t>Model</a:t>
+              <a:t>et</a:t>
+            </a:r>
+            <a:r>
+              <a:rPr/>
+              <a:t> </a:t>
+            </a:r>
+            <a:r>
+              <a:rPr/>
+              <a:t>al</a:t>
             </a:r>
             <a:r>
               <a:rPr/>

</xml_diff>